<commit_message>
Changes as per PR #386. Modified z array diagram. Removed line with similar (duplicate) information detailing number of channels.
</commit_message>
<xml_diff>
--- a/doc/images/z_array.pptx
+++ b/doc/images/z_array.pptx
@@ -19447,7 +19447,31 @@
                 <a:cs typeface="Helvetica Neue"/>
                 <a:sym typeface="Helvetica Neue"/>
               </a:rPr>
-              <a:t> (real-valued samples) of length </a:t>
+              <a:t> (</a:t>
+            </a:r>
+            <a:r>
+              <a:rPr lang="en-US" sz="3600">
+                <a:solidFill>
+                  <a:srgbClr val="5E5E5E"/>
+                </a:solidFill>
+                <a:latin typeface="Helvetica Neue"/>
+                <a:ea typeface="Helvetica Neue"/>
+                <a:cs typeface="Helvetica Neue"/>
+                <a:sym typeface="Helvetica Neue"/>
+              </a:rPr>
+              <a:t>complex</a:t>
+            </a:r>
+            <a:r>
+              <a:rPr b="0" i="0" lang="en-US" sz="3600" u="none" cap="none" strike="noStrike">
+                <a:solidFill>
+                  <a:srgbClr val="5E5E5E"/>
+                </a:solidFill>
+                <a:latin typeface="Helvetica Neue"/>
+                <a:ea typeface="Helvetica Neue"/>
+                <a:cs typeface="Helvetica Neue"/>
+                <a:sym typeface="Helvetica Neue"/>
+              </a:rPr>
+              <a:t>-valued samples) of length </a:t>
             </a:r>
             <a:r>
               <a:rPr b="0" i="1" lang="en-US" sz="3600" u="none" cap="none" strike="noStrike">
@@ -19478,7 +19502,7 @@
   <a:themeElements>
     <a:clrScheme name="21_BasicWhite">
       <a:dk1>
-        <a:srgbClr val="5E5E5E"/>
+        <a:srgbClr val="000000"/>
       </a:dk1>
       <a:lt1>
         <a:srgbClr val="FFFFFF"/>
@@ -19757,7 +19781,7 @@
   <a:themeElements>
     <a:clrScheme name="21_BasicWhite">
       <a:dk1>
-        <a:srgbClr val="000000"/>
+        <a:srgbClr val="5E5E5E"/>
       </a:dk1>
       <a:lt1>
         <a:srgbClr val="FFFFFF"/>

</xml_diff>